<commit_message>
animated the question box thingy, but with more code!
</commit_message>
<xml_diff>
--- a/ui designs.pptx
+++ b/ui designs.pptx
@@ -262,7 +262,7 @@
           <a:p>
             <a:fld id="{31E70AC4-149A-438B-99DD-22F666C1306E}" type="datetimeFigureOut">
               <a:rPr lang="en-US" smtClean="0"/>
-              <a:t>2/17/2020</a:t>
+              <a:t>3/18/2020</a:t>
             </a:fld>
             <a:endParaRPr lang="en-US"/>
           </a:p>
@@ -460,7 +460,7 @@
           <a:p>
             <a:fld id="{31E70AC4-149A-438B-99DD-22F666C1306E}" type="datetimeFigureOut">
               <a:rPr lang="en-US" smtClean="0"/>
-              <a:t>2/17/2020</a:t>
+              <a:t>3/18/2020</a:t>
             </a:fld>
             <a:endParaRPr lang="en-US"/>
           </a:p>
@@ -668,7 +668,7 @@
           <a:p>
             <a:fld id="{31E70AC4-149A-438B-99DD-22F666C1306E}" type="datetimeFigureOut">
               <a:rPr lang="en-US" smtClean="0"/>
-              <a:t>2/17/2020</a:t>
+              <a:t>3/18/2020</a:t>
             </a:fld>
             <a:endParaRPr lang="en-US"/>
           </a:p>
@@ -866,7 +866,7 @@
           <a:p>
             <a:fld id="{31E70AC4-149A-438B-99DD-22F666C1306E}" type="datetimeFigureOut">
               <a:rPr lang="en-US" smtClean="0"/>
-              <a:t>2/17/2020</a:t>
+              <a:t>3/18/2020</a:t>
             </a:fld>
             <a:endParaRPr lang="en-US"/>
           </a:p>
@@ -1141,7 +1141,7 @@
           <a:p>
             <a:fld id="{31E70AC4-149A-438B-99DD-22F666C1306E}" type="datetimeFigureOut">
               <a:rPr lang="en-US" smtClean="0"/>
-              <a:t>2/17/2020</a:t>
+              <a:t>3/18/2020</a:t>
             </a:fld>
             <a:endParaRPr lang="en-US"/>
           </a:p>
@@ -1406,7 +1406,7 @@
           <a:p>
             <a:fld id="{31E70AC4-149A-438B-99DD-22F666C1306E}" type="datetimeFigureOut">
               <a:rPr lang="en-US" smtClean="0"/>
-              <a:t>2/17/2020</a:t>
+              <a:t>3/18/2020</a:t>
             </a:fld>
             <a:endParaRPr lang="en-US"/>
           </a:p>
@@ -1818,7 +1818,7 @@
           <a:p>
             <a:fld id="{31E70AC4-149A-438B-99DD-22F666C1306E}" type="datetimeFigureOut">
               <a:rPr lang="en-US" smtClean="0"/>
-              <a:t>2/17/2020</a:t>
+              <a:t>3/18/2020</a:t>
             </a:fld>
             <a:endParaRPr lang="en-US"/>
           </a:p>
@@ -1959,7 +1959,7 @@
           <a:p>
             <a:fld id="{31E70AC4-149A-438B-99DD-22F666C1306E}" type="datetimeFigureOut">
               <a:rPr lang="en-US" smtClean="0"/>
-              <a:t>2/17/2020</a:t>
+              <a:t>3/18/2020</a:t>
             </a:fld>
             <a:endParaRPr lang="en-US"/>
           </a:p>
@@ -2072,7 +2072,7 @@
           <a:p>
             <a:fld id="{31E70AC4-149A-438B-99DD-22F666C1306E}" type="datetimeFigureOut">
               <a:rPr lang="en-US" smtClean="0"/>
-              <a:t>2/17/2020</a:t>
+              <a:t>3/18/2020</a:t>
             </a:fld>
             <a:endParaRPr lang="en-US"/>
           </a:p>
@@ -2383,7 +2383,7 @@
           <a:p>
             <a:fld id="{31E70AC4-149A-438B-99DD-22F666C1306E}" type="datetimeFigureOut">
               <a:rPr lang="en-US" smtClean="0"/>
-              <a:t>2/17/2020</a:t>
+              <a:t>3/18/2020</a:t>
             </a:fld>
             <a:endParaRPr lang="en-US"/>
           </a:p>
@@ -2671,7 +2671,7 @@
           <a:p>
             <a:fld id="{31E70AC4-149A-438B-99DD-22F666C1306E}" type="datetimeFigureOut">
               <a:rPr lang="en-US" smtClean="0"/>
-              <a:t>2/17/2020</a:t>
+              <a:t>3/18/2020</a:t>
             </a:fld>
             <a:endParaRPr lang="en-US"/>
           </a:p>
@@ -2912,7 +2912,7 @@
           <a:p>
             <a:fld id="{31E70AC4-149A-438B-99DD-22F666C1306E}" type="datetimeFigureOut">
               <a:rPr lang="en-US" smtClean="0"/>
-              <a:t>2/17/2020</a:t>
+              <a:t>3/18/2020</a:t>
             </a:fld>
             <a:endParaRPr lang="en-US"/>
           </a:p>
@@ -8204,6 +8204,255 @@
           </a:p>
         </p:txBody>
       </p:sp>
+      <p:grpSp>
+        <p:nvGrpSpPr>
+          <p:cNvPr id="41" name="Group 40">
+            <a:extLst>
+              <a:ext uri="{FF2B5EF4-FFF2-40B4-BE49-F238E27FC236}">
+                <a16:creationId xmlns:a16="http://schemas.microsoft.com/office/drawing/2014/main" id="{1B2055E7-53F2-4508-80BD-FFB0E03581BF}"/>
+              </a:ext>
+            </a:extLst>
+          </p:cNvPr>
+          <p:cNvGrpSpPr/>
+          <p:nvPr/>
+        </p:nvGrpSpPr>
+        <p:grpSpPr>
+          <a:xfrm rot="21398268">
+            <a:off x="4462940" y="5178590"/>
+            <a:ext cx="3500466" cy="1363202"/>
+            <a:chOff x="2234414" y="1043835"/>
+            <a:chExt cx="3500466" cy="1363202"/>
+          </a:xfrm>
+        </p:grpSpPr>
+        <p:pic>
+          <p:nvPicPr>
+            <p:cNvPr id="42" name="Picture 41">
+              <a:extLst>
+                <a:ext uri="{FF2B5EF4-FFF2-40B4-BE49-F238E27FC236}">
+                  <a16:creationId xmlns:a16="http://schemas.microsoft.com/office/drawing/2014/main" id="{D0587D22-C635-458F-861E-6831733C0FDD}"/>
+                </a:ext>
+              </a:extLst>
+            </p:cNvPr>
+            <p:cNvPicPr>
+              <a:picLocks noChangeAspect="1"/>
+            </p:cNvPicPr>
+            <p:nvPr/>
+          </p:nvPicPr>
+          <p:blipFill>
+            <a:blip r:embed="rId4">
+              <a:biLevel thresh="75000"/>
+            </a:blip>
+            <a:stretch>
+              <a:fillRect/>
+            </a:stretch>
+          </p:blipFill>
+          <p:spPr>
+            <a:xfrm>
+              <a:off x="2234414" y="1047511"/>
+              <a:ext cx="3475021" cy="1359526"/>
+            </a:xfrm>
+            <a:prstGeom prst="rect">
+              <a:avLst/>
+            </a:prstGeom>
+          </p:spPr>
+        </p:pic>
+        <p:sp>
+          <p:nvSpPr>
+            <p:cNvPr id="43" name="Arrow: Down 42">
+              <a:extLst>
+                <a:ext uri="{FF2B5EF4-FFF2-40B4-BE49-F238E27FC236}">
+                  <a16:creationId xmlns:a16="http://schemas.microsoft.com/office/drawing/2014/main" id="{4704D368-F210-4792-99C9-E723D0357233}"/>
+                </a:ext>
+              </a:extLst>
+            </p:cNvPr>
+            <p:cNvSpPr/>
+            <p:nvPr/>
+          </p:nvSpPr>
+          <p:spPr>
+            <a:xfrm rot="5621296">
+              <a:off x="3376947" y="-17707"/>
+              <a:ext cx="1296392" cy="3419475"/>
+            </a:xfrm>
+            <a:custGeom>
+              <a:avLst/>
+              <a:gdLst>
+                <a:gd name="connsiteX0" fmla="*/ 0 w 1296392"/>
+                <a:gd name="connsiteY0" fmla="*/ 2771279 h 3419475"/>
+                <a:gd name="connsiteX1" fmla="*/ 324098 w 1296392"/>
+                <a:gd name="connsiteY1" fmla="*/ 2771279 h 3419475"/>
+                <a:gd name="connsiteX2" fmla="*/ 324098 w 1296392"/>
+                <a:gd name="connsiteY2" fmla="*/ 0 h 3419475"/>
+                <a:gd name="connsiteX3" fmla="*/ 972294 w 1296392"/>
+                <a:gd name="connsiteY3" fmla="*/ 0 h 3419475"/>
+                <a:gd name="connsiteX4" fmla="*/ 972294 w 1296392"/>
+                <a:gd name="connsiteY4" fmla="*/ 2771279 h 3419475"/>
+                <a:gd name="connsiteX5" fmla="*/ 1296392 w 1296392"/>
+                <a:gd name="connsiteY5" fmla="*/ 2771279 h 3419475"/>
+                <a:gd name="connsiteX6" fmla="*/ 648196 w 1296392"/>
+                <a:gd name="connsiteY6" fmla="*/ 3419475 h 3419475"/>
+                <a:gd name="connsiteX7" fmla="*/ 0 w 1296392"/>
+                <a:gd name="connsiteY7" fmla="*/ 2771279 h 3419475"/>
+              </a:gdLst>
+              <a:ahLst/>
+              <a:cxnLst>
+                <a:cxn ang="0">
+                  <a:pos x="connsiteX0" y="connsiteY0"/>
+                </a:cxn>
+                <a:cxn ang="0">
+                  <a:pos x="connsiteX1" y="connsiteY1"/>
+                </a:cxn>
+                <a:cxn ang="0">
+                  <a:pos x="connsiteX2" y="connsiteY2"/>
+                </a:cxn>
+                <a:cxn ang="0">
+                  <a:pos x="connsiteX3" y="connsiteY3"/>
+                </a:cxn>
+                <a:cxn ang="0">
+                  <a:pos x="connsiteX4" y="connsiteY4"/>
+                </a:cxn>
+                <a:cxn ang="0">
+                  <a:pos x="connsiteX5" y="connsiteY5"/>
+                </a:cxn>
+                <a:cxn ang="0">
+                  <a:pos x="connsiteX6" y="connsiteY6"/>
+                </a:cxn>
+                <a:cxn ang="0">
+                  <a:pos x="connsiteX7" y="connsiteY7"/>
+                </a:cxn>
+              </a:cxnLst>
+              <a:rect l="l" t="t" r="r" b="b"/>
+              <a:pathLst>
+                <a:path w="1296392" h="3419475" fill="none" extrusionOk="0">
+                  <a:moveTo>
+                    <a:pt x="0" y="2771279"/>
+                  </a:moveTo>
+                  <a:cubicBezTo>
+                    <a:pt x="138410" y="2786593"/>
+                    <a:pt x="184062" y="2757793"/>
+                    <a:pt x="324098" y="2771279"/>
+                  </a:cubicBezTo>
+                  <a:cubicBezTo>
+                    <a:pt x="412736" y="1544455"/>
+                    <a:pt x="317542" y="299789"/>
+                    <a:pt x="324098" y="0"/>
+                  </a:cubicBezTo>
+                  <a:cubicBezTo>
+                    <a:pt x="451172" y="53344"/>
+                    <a:pt x="806364" y="-30934"/>
+                    <a:pt x="972294" y="0"/>
+                  </a:cubicBezTo>
+                  <a:cubicBezTo>
+                    <a:pt x="842731" y="464884"/>
+                    <a:pt x="886965" y="2194487"/>
+                    <a:pt x="972294" y="2771279"/>
+                  </a:cubicBezTo>
+                  <a:cubicBezTo>
+                    <a:pt x="1095827" y="2753763"/>
+                    <a:pt x="1212742" y="2760094"/>
+                    <a:pt x="1296392" y="2771279"/>
+                  </a:cubicBezTo>
+                  <a:cubicBezTo>
+                    <a:pt x="1052660" y="3069003"/>
+                    <a:pt x="882365" y="3300590"/>
+                    <a:pt x="648196" y="3419475"/>
+                  </a:cubicBezTo>
+                  <a:cubicBezTo>
+                    <a:pt x="511049" y="3372739"/>
+                    <a:pt x="115334" y="2931513"/>
+                    <a:pt x="0" y="2771279"/>
+                  </a:cubicBezTo>
+                  <a:close/>
+                </a:path>
+                <a:path w="1296392" h="3419475" stroke="0" extrusionOk="0">
+                  <a:moveTo>
+                    <a:pt x="0" y="2771279"/>
+                  </a:moveTo>
+                  <a:cubicBezTo>
+                    <a:pt x="53088" y="2759783"/>
+                    <a:pt x="240332" y="2789096"/>
+                    <a:pt x="324098" y="2771279"/>
+                  </a:cubicBezTo>
+                  <a:cubicBezTo>
+                    <a:pt x="214936" y="2182577"/>
+                    <a:pt x="401991" y="1129436"/>
+                    <a:pt x="324098" y="0"/>
+                  </a:cubicBezTo>
+                  <a:cubicBezTo>
+                    <a:pt x="570874" y="-22003"/>
+                    <a:pt x="842254" y="30738"/>
+                    <a:pt x="972294" y="0"/>
+                  </a:cubicBezTo>
+                  <a:cubicBezTo>
+                    <a:pt x="1052033" y="1257126"/>
+                    <a:pt x="804133" y="1710176"/>
+                    <a:pt x="972294" y="2771279"/>
+                  </a:cubicBezTo>
+                  <a:cubicBezTo>
+                    <a:pt x="1087472" y="2753117"/>
+                    <a:pt x="1200859" y="2751964"/>
+                    <a:pt x="1296392" y="2771279"/>
+                  </a:cubicBezTo>
+                  <a:cubicBezTo>
+                    <a:pt x="932208" y="3028416"/>
+                    <a:pt x="981518" y="3178178"/>
+                    <a:pt x="648196" y="3419475"/>
+                  </a:cubicBezTo>
+                  <a:cubicBezTo>
+                    <a:pt x="554431" y="3362380"/>
+                    <a:pt x="271186" y="3140316"/>
+                    <a:pt x="0" y="2771279"/>
+                  </a:cubicBezTo>
+                  <a:close/>
+                </a:path>
+              </a:pathLst>
+            </a:custGeom>
+            <a:solidFill>
+              <a:schemeClr val="bg1"/>
+            </a:solidFill>
+            <a:ln w="28575">
+              <a:solidFill>
+                <a:schemeClr val="tx1"/>
+              </a:solidFill>
+              <a:extLst>
+                <a:ext uri="{C807C97D-BFC1-408E-A445-0C87EB9F89A2}">
+                  <ask:lineSketchStyleProps xmlns:ask="http://schemas.microsoft.com/office/drawing/2018/sketchyshapes" sd="3891763602">
+                    <a:prstGeom prst="downArrow">
+                      <a:avLst/>
+                    </a:prstGeom>
+                    <ask:type>
+                      <ask:lineSketchCurved/>
+                    </ask:type>
+                  </ask:lineSketchStyleProps>
+                </a:ext>
+              </a:extLst>
+            </a:ln>
+          </p:spPr>
+          <p:style>
+            <a:lnRef idx="2">
+              <a:schemeClr val="accent1">
+                <a:shade val="50000"/>
+              </a:schemeClr>
+            </a:lnRef>
+            <a:fillRef idx="1">
+              <a:schemeClr val="accent1"/>
+            </a:fillRef>
+            <a:effectRef idx="0">
+              <a:schemeClr val="accent1"/>
+            </a:effectRef>
+            <a:fontRef idx="minor">
+              <a:schemeClr val="lt1"/>
+            </a:fontRef>
+          </p:style>
+          <p:txBody>
+            <a:bodyPr rtlCol="0" anchor="ctr"/>
+            <a:lstStyle/>
+            <a:p>
+              <a:pPr algn="ctr"/>
+              <a:endParaRPr lang="en-US"/>
+            </a:p>
+          </p:txBody>
+        </p:sp>
+      </p:grpSp>
     </p:spTree>
     <p:extLst>
       <p:ext uri="{BB962C8B-B14F-4D97-AF65-F5344CB8AC3E}">

</xml_diff>

<commit_message>
Got import feature working
</commit_message>
<xml_diff>
--- a/ui designs.pptx
+++ b/ui designs.pptx
@@ -262,7 +262,7 @@
           <a:p>
             <a:fld id="{31E70AC4-149A-438B-99DD-22F666C1306E}" type="datetimeFigureOut">
               <a:rPr lang="en-US" smtClean="0"/>
-              <a:t>3/18/2020</a:t>
+              <a:t>4/3/2020</a:t>
             </a:fld>
             <a:endParaRPr lang="en-US"/>
           </a:p>
@@ -460,7 +460,7 @@
           <a:p>
             <a:fld id="{31E70AC4-149A-438B-99DD-22F666C1306E}" type="datetimeFigureOut">
               <a:rPr lang="en-US" smtClean="0"/>
-              <a:t>3/18/2020</a:t>
+              <a:t>4/3/2020</a:t>
             </a:fld>
             <a:endParaRPr lang="en-US"/>
           </a:p>
@@ -668,7 +668,7 @@
           <a:p>
             <a:fld id="{31E70AC4-149A-438B-99DD-22F666C1306E}" type="datetimeFigureOut">
               <a:rPr lang="en-US" smtClean="0"/>
-              <a:t>3/18/2020</a:t>
+              <a:t>4/3/2020</a:t>
             </a:fld>
             <a:endParaRPr lang="en-US"/>
           </a:p>
@@ -866,7 +866,7 @@
           <a:p>
             <a:fld id="{31E70AC4-149A-438B-99DD-22F666C1306E}" type="datetimeFigureOut">
               <a:rPr lang="en-US" smtClean="0"/>
-              <a:t>3/18/2020</a:t>
+              <a:t>4/3/2020</a:t>
             </a:fld>
             <a:endParaRPr lang="en-US"/>
           </a:p>
@@ -1141,7 +1141,7 @@
           <a:p>
             <a:fld id="{31E70AC4-149A-438B-99DD-22F666C1306E}" type="datetimeFigureOut">
               <a:rPr lang="en-US" smtClean="0"/>
-              <a:t>3/18/2020</a:t>
+              <a:t>4/3/2020</a:t>
             </a:fld>
             <a:endParaRPr lang="en-US"/>
           </a:p>
@@ -1406,7 +1406,7 @@
           <a:p>
             <a:fld id="{31E70AC4-149A-438B-99DD-22F666C1306E}" type="datetimeFigureOut">
               <a:rPr lang="en-US" smtClean="0"/>
-              <a:t>3/18/2020</a:t>
+              <a:t>4/3/2020</a:t>
             </a:fld>
             <a:endParaRPr lang="en-US"/>
           </a:p>
@@ -1818,7 +1818,7 @@
           <a:p>
             <a:fld id="{31E70AC4-149A-438B-99DD-22F666C1306E}" type="datetimeFigureOut">
               <a:rPr lang="en-US" smtClean="0"/>
-              <a:t>3/18/2020</a:t>
+              <a:t>4/3/2020</a:t>
             </a:fld>
             <a:endParaRPr lang="en-US"/>
           </a:p>
@@ -1959,7 +1959,7 @@
           <a:p>
             <a:fld id="{31E70AC4-149A-438B-99DD-22F666C1306E}" type="datetimeFigureOut">
               <a:rPr lang="en-US" smtClean="0"/>
-              <a:t>3/18/2020</a:t>
+              <a:t>4/3/2020</a:t>
             </a:fld>
             <a:endParaRPr lang="en-US"/>
           </a:p>
@@ -2072,7 +2072,7 @@
           <a:p>
             <a:fld id="{31E70AC4-149A-438B-99DD-22F666C1306E}" type="datetimeFigureOut">
               <a:rPr lang="en-US" smtClean="0"/>
-              <a:t>3/18/2020</a:t>
+              <a:t>4/3/2020</a:t>
             </a:fld>
             <a:endParaRPr lang="en-US"/>
           </a:p>
@@ -2383,7 +2383,7 @@
           <a:p>
             <a:fld id="{31E70AC4-149A-438B-99DD-22F666C1306E}" type="datetimeFigureOut">
               <a:rPr lang="en-US" smtClean="0"/>
-              <a:t>3/18/2020</a:t>
+              <a:t>4/3/2020</a:t>
             </a:fld>
             <a:endParaRPr lang="en-US"/>
           </a:p>
@@ -2671,7 +2671,7 @@
           <a:p>
             <a:fld id="{31E70AC4-149A-438B-99DD-22F666C1306E}" type="datetimeFigureOut">
               <a:rPr lang="en-US" smtClean="0"/>
-              <a:t>3/18/2020</a:t>
+              <a:t>4/3/2020</a:t>
             </a:fld>
             <a:endParaRPr lang="en-US"/>
           </a:p>
@@ -2912,7 +2912,7 @@
           <a:p>
             <a:fld id="{31E70AC4-149A-438B-99DD-22F666C1306E}" type="datetimeFigureOut">
               <a:rPr lang="en-US" smtClean="0"/>
-              <a:t>3/18/2020</a:t>
+              <a:t>4/3/2020</a:t>
             </a:fld>
             <a:endParaRPr lang="en-US"/>
           </a:p>
@@ -5011,530 +5011,6 @@
           </p:txBody>
         </p:sp>
       </p:grpSp>
-      <p:sp>
-        <p:nvSpPr>
-          <p:cNvPr id="43" name="Rectangle 42">
-            <a:extLst>
-              <a:ext uri="{FF2B5EF4-FFF2-40B4-BE49-F238E27FC236}">
-                <a16:creationId xmlns:a16="http://schemas.microsoft.com/office/drawing/2014/main" id="{3F76F4F6-C6E7-4DED-8F7C-565592549583}"/>
-              </a:ext>
-            </a:extLst>
-          </p:cNvPr>
-          <p:cNvSpPr/>
-          <p:nvPr/>
-        </p:nvSpPr>
-        <p:spPr>
-          <a:xfrm rot="300000">
-            <a:off x="7647165" y="2878596"/>
-            <a:ext cx="5816635" cy="1864458"/>
-          </a:xfrm>
-          <a:custGeom>
-            <a:avLst/>
-            <a:gdLst>
-              <a:gd name="connsiteX0" fmla="*/ 0 w 5816635"/>
-              <a:gd name="connsiteY0" fmla="*/ 0 h 1864458"/>
-              <a:gd name="connsiteX1" fmla="*/ 523497 w 5816635"/>
-              <a:gd name="connsiteY1" fmla="*/ 0 h 1864458"/>
-              <a:gd name="connsiteX2" fmla="*/ 1105161 w 5816635"/>
-              <a:gd name="connsiteY2" fmla="*/ 0 h 1864458"/>
-              <a:gd name="connsiteX3" fmla="*/ 1803157 w 5816635"/>
-              <a:gd name="connsiteY3" fmla="*/ 0 h 1864458"/>
-              <a:gd name="connsiteX4" fmla="*/ 2268488 w 5816635"/>
-              <a:gd name="connsiteY4" fmla="*/ 0 h 1864458"/>
-              <a:gd name="connsiteX5" fmla="*/ 2675652 w 5816635"/>
-              <a:gd name="connsiteY5" fmla="*/ 0 h 1864458"/>
-              <a:gd name="connsiteX6" fmla="*/ 3199149 w 5816635"/>
-              <a:gd name="connsiteY6" fmla="*/ 0 h 1864458"/>
-              <a:gd name="connsiteX7" fmla="*/ 3722646 w 5816635"/>
-              <a:gd name="connsiteY7" fmla="*/ 0 h 1864458"/>
-              <a:gd name="connsiteX8" fmla="*/ 4187977 w 5816635"/>
-              <a:gd name="connsiteY8" fmla="*/ 0 h 1864458"/>
-              <a:gd name="connsiteX9" fmla="*/ 4827807 w 5816635"/>
-              <a:gd name="connsiteY9" fmla="*/ 0 h 1864458"/>
-              <a:gd name="connsiteX10" fmla="*/ 5816635 w 5816635"/>
-              <a:gd name="connsiteY10" fmla="*/ 0 h 1864458"/>
-              <a:gd name="connsiteX11" fmla="*/ 5816635 w 5816635"/>
-              <a:gd name="connsiteY11" fmla="*/ 447470 h 1864458"/>
-              <a:gd name="connsiteX12" fmla="*/ 5816635 w 5816635"/>
-              <a:gd name="connsiteY12" fmla="*/ 913584 h 1864458"/>
-              <a:gd name="connsiteX13" fmla="*/ 5816635 w 5816635"/>
-              <a:gd name="connsiteY13" fmla="*/ 1323765 h 1864458"/>
-              <a:gd name="connsiteX14" fmla="*/ 5816635 w 5816635"/>
-              <a:gd name="connsiteY14" fmla="*/ 1864458 h 1864458"/>
-              <a:gd name="connsiteX15" fmla="*/ 5176805 w 5816635"/>
-              <a:gd name="connsiteY15" fmla="*/ 1864458 h 1864458"/>
-              <a:gd name="connsiteX16" fmla="*/ 4478809 w 5816635"/>
-              <a:gd name="connsiteY16" fmla="*/ 1864458 h 1864458"/>
-              <a:gd name="connsiteX17" fmla="*/ 3838979 w 5816635"/>
-              <a:gd name="connsiteY17" fmla="*/ 1864458 h 1864458"/>
-              <a:gd name="connsiteX18" fmla="*/ 3315482 w 5816635"/>
-              <a:gd name="connsiteY18" fmla="*/ 1864458 h 1864458"/>
-              <a:gd name="connsiteX19" fmla="*/ 2850151 w 5816635"/>
-              <a:gd name="connsiteY19" fmla="*/ 1864458 h 1864458"/>
-              <a:gd name="connsiteX20" fmla="*/ 2326654 w 5816635"/>
-              <a:gd name="connsiteY20" fmla="*/ 1864458 h 1864458"/>
-              <a:gd name="connsiteX21" fmla="*/ 1919490 w 5816635"/>
-              <a:gd name="connsiteY21" fmla="*/ 1864458 h 1864458"/>
-              <a:gd name="connsiteX22" fmla="*/ 1395992 w 5816635"/>
-              <a:gd name="connsiteY22" fmla="*/ 1864458 h 1864458"/>
-              <a:gd name="connsiteX23" fmla="*/ 872495 w 5816635"/>
-              <a:gd name="connsiteY23" fmla="*/ 1864458 h 1864458"/>
-              <a:gd name="connsiteX24" fmla="*/ 0 w 5816635"/>
-              <a:gd name="connsiteY24" fmla="*/ 1864458 h 1864458"/>
-              <a:gd name="connsiteX25" fmla="*/ 0 w 5816635"/>
-              <a:gd name="connsiteY25" fmla="*/ 1454277 h 1864458"/>
-              <a:gd name="connsiteX26" fmla="*/ 0 w 5816635"/>
-              <a:gd name="connsiteY26" fmla="*/ 988163 h 1864458"/>
-              <a:gd name="connsiteX27" fmla="*/ 0 w 5816635"/>
-              <a:gd name="connsiteY27" fmla="*/ 577982 h 1864458"/>
-              <a:gd name="connsiteX28" fmla="*/ 0 w 5816635"/>
-              <a:gd name="connsiteY28" fmla="*/ 0 h 1864458"/>
-            </a:gdLst>
-            <a:ahLst/>
-            <a:cxnLst>
-              <a:cxn ang="0">
-                <a:pos x="connsiteX0" y="connsiteY0"/>
-              </a:cxn>
-              <a:cxn ang="0">
-                <a:pos x="connsiteX1" y="connsiteY1"/>
-              </a:cxn>
-              <a:cxn ang="0">
-                <a:pos x="connsiteX2" y="connsiteY2"/>
-              </a:cxn>
-              <a:cxn ang="0">
-                <a:pos x="connsiteX3" y="connsiteY3"/>
-              </a:cxn>
-              <a:cxn ang="0">
-                <a:pos x="connsiteX4" y="connsiteY4"/>
-              </a:cxn>
-              <a:cxn ang="0">
-                <a:pos x="connsiteX5" y="connsiteY5"/>
-              </a:cxn>
-              <a:cxn ang="0">
-                <a:pos x="connsiteX6" y="connsiteY6"/>
-              </a:cxn>
-              <a:cxn ang="0">
-                <a:pos x="connsiteX7" y="connsiteY7"/>
-              </a:cxn>
-              <a:cxn ang="0">
-                <a:pos x="connsiteX8" y="connsiteY8"/>
-              </a:cxn>
-              <a:cxn ang="0">
-                <a:pos x="connsiteX9" y="connsiteY9"/>
-              </a:cxn>
-              <a:cxn ang="0">
-                <a:pos x="connsiteX10" y="connsiteY10"/>
-              </a:cxn>
-              <a:cxn ang="0">
-                <a:pos x="connsiteX11" y="connsiteY11"/>
-              </a:cxn>
-              <a:cxn ang="0">
-                <a:pos x="connsiteX12" y="connsiteY12"/>
-              </a:cxn>
-              <a:cxn ang="0">
-                <a:pos x="connsiteX13" y="connsiteY13"/>
-              </a:cxn>
-              <a:cxn ang="0">
-                <a:pos x="connsiteX14" y="connsiteY14"/>
-              </a:cxn>
-              <a:cxn ang="0">
-                <a:pos x="connsiteX15" y="connsiteY15"/>
-              </a:cxn>
-              <a:cxn ang="0">
-                <a:pos x="connsiteX16" y="connsiteY16"/>
-              </a:cxn>
-              <a:cxn ang="0">
-                <a:pos x="connsiteX17" y="connsiteY17"/>
-              </a:cxn>
-              <a:cxn ang="0">
-                <a:pos x="connsiteX18" y="connsiteY18"/>
-              </a:cxn>
-              <a:cxn ang="0">
-                <a:pos x="connsiteX19" y="connsiteY19"/>
-              </a:cxn>
-              <a:cxn ang="0">
-                <a:pos x="connsiteX20" y="connsiteY20"/>
-              </a:cxn>
-              <a:cxn ang="0">
-                <a:pos x="connsiteX21" y="connsiteY21"/>
-              </a:cxn>
-              <a:cxn ang="0">
-                <a:pos x="connsiteX22" y="connsiteY22"/>
-              </a:cxn>
-              <a:cxn ang="0">
-                <a:pos x="connsiteX23" y="connsiteY23"/>
-              </a:cxn>
-              <a:cxn ang="0">
-                <a:pos x="connsiteX24" y="connsiteY24"/>
-              </a:cxn>
-              <a:cxn ang="0">
-                <a:pos x="connsiteX25" y="connsiteY25"/>
-              </a:cxn>
-              <a:cxn ang="0">
-                <a:pos x="connsiteX26" y="connsiteY26"/>
-              </a:cxn>
-              <a:cxn ang="0">
-                <a:pos x="connsiteX27" y="connsiteY27"/>
-              </a:cxn>
-              <a:cxn ang="0">
-                <a:pos x="connsiteX28" y="connsiteY28"/>
-              </a:cxn>
-            </a:cxnLst>
-            <a:rect l="l" t="t" r="r" b="b"/>
-            <a:pathLst>
-              <a:path w="5816635" h="1864458" fill="none" extrusionOk="0">
-                <a:moveTo>
-                  <a:pt x="0" y="0"/>
-                </a:moveTo>
-                <a:cubicBezTo>
-                  <a:pt x="238561" y="-57148"/>
-                  <a:pt x="342151" y="26602"/>
-                  <a:pt x="523497" y="0"/>
-                </a:cubicBezTo>
-                <a:cubicBezTo>
-                  <a:pt x="704843" y="-26602"/>
-                  <a:pt x="946376" y="59318"/>
-                  <a:pt x="1105161" y="0"/>
-                </a:cubicBezTo>
-                <a:cubicBezTo>
-                  <a:pt x="1263946" y="-59318"/>
-                  <a:pt x="1487487" y="21167"/>
-                  <a:pt x="1803157" y="0"/>
-                </a:cubicBezTo>
-                <a:cubicBezTo>
-                  <a:pt x="2118827" y="-21167"/>
-                  <a:pt x="2108691" y="38436"/>
-                  <a:pt x="2268488" y="0"/>
-                </a:cubicBezTo>
-                <a:cubicBezTo>
-                  <a:pt x="2428285" y="-38436"/>
-                  <a:pt x="2562156" y="47455"/>
-                  <a:pt x="2675652" y="0"/>
-                </a:cubicBezTo>
-                <a:cubicBezTo>
-                  <a:pt x="2789148" y="-47455"/>
-                  <a:pt x="3080214" y="34261"/>
-                  <a:pt x="3199149" y="0"/>
-                </a:cubicBezTo>
-                <a:cubicBezTo>
-                  <a:pt x="3318084" y="-34261"/>
-                  <a:pt x="3499962" y="7720"/>
-                  <a:pt x="3722646" y="0"/>
-                </a:cubicBezTo>
-                <a:cubicBezTo>
-                  <a:pt x="3945330" y="-7720"/>
-                  <a:pt x="3985942" y="31401"/>
-                  <a:pt x="4187977" y="0"/>
-                </a:cubicBezTo>
-                <a:cubicBezTo>
-                  <a:pt x="4390012" y="-31401"/>
-                  <a:pt x="4605822" y="24186"/>
-                  <a:pt x="4827807" y="0"/>
-                </a:cubicBezTo>
-                <a:cubicBezTo>
-                  <a:pt x="5049792" y="-24186"/>
-                  <a:pt x="5427684" y="72617"/>
-                  <a:pt x="5816635" y="0"/>
-                </a:cubicBezTo>
-                <a:cubicBezTo>
-                  <a:pt x="5843181" y="92012"/>
-                  <a:pt x="5781745" y="289691"/>
-                  <a:pt x="5816635" y="447470"/>
-                </a:cubicBezTo>
-                <a:cubicBezTo>
-                  <a:pt x="5851525" y="605249"/>
-                  <a:pt x="5795905" y="685674"/>
-                  <a:pt x="5816635" y="913584"/>
-                </a:cubicBezTo>
-                <a:cubicBezTo>
-                  <a:pt x="5837365" y="1141494"/>
-                  <a:pt x="5802575" y="1169417"/>
-                  <a:pt x="5816635" y="1323765"/>
-                </a:cubicBezTo>
-                <a:cubicBezTo>
-                  <a:pt x="5830695" y="1478113"/>
-                  <a:pt x="5760000" y="1606869"/>
-                  <a:pt x="5816635" y="1864458"/>
-                </a:cubicBezTo>
-                <a:cubicBezTo>
-                  <a:pt x="5686854" y="1886581"/>
-                  <a:pt x="5476489" y="1862405"/>
-                  <a:pt x="5176805" y="1864458"/>
-                </a:cubicBezTo>
-                <a:cubicBezTo>
-                  <a:pt x="4877121" y="1866511"/>
-                  <a:pt x="4669361" y="1802200"/>
-                  <a:pt x="4478809" y="1864458"/>
-                </a:cubicBezTo>
-                <a:cubicBezTo>
-                  <a:pt x="4288257" y="1926716"/>
-                  <a:pt x="4007856" y="1829572"/>
-                  <a:pt x="3838979" y="1864458"/>
-                </a:cubicBezTo>
-                <a:cubicBezTo>
-                  <a:pt x="3670102" y="1899344"/>
-                  <a:pt x="3462233" y="1826492"/>
-                  <a:pt x="3315482" y="1864458"/>
-                </a:cubicBezTo>
-                <a:cubicBezTo>
-                  <a:pt x="3168731" y="1902424"/>
-                  <a:pt x="3046308" y="1836835"/>
-                  <a:pt x="2850151" y="1864458"/>
-                </a:cubicBezTo>
-                <a:cubicBezTo>
-                  <a:pt x="2653994" y="1892081"/>
-                  <a:pt x="2446911" y="1852339"/>
-                  <a:pt x="2326654" y="1864458"/>
-                </a:cubicBezTo>
-                <a:cubicBezTo>
-                  <a:pt x="2206397" y="1876577"/>
-                  <a:pt x="2026824" y="1852159"/>
-                  <a:pt x="1919490" y="1864458"/>
-                </a:cubicBezTo>
-                <a:cubicBezTo>
-                  <a:pt x="1812156" y="1876757"/>
-                  <a:pt x="1521046" y="1839706"/>
-                  <a:pt x="1395992" y="1864458"/>
-                </a:cubicBezTo>
-                <a:cubicBezTo>
-                  <a:pt x="1270938" y="1889210"/>
-                  <a:pt x="979239" y="1862781"/>
-                  <a:pt x="872495" y="1864458"/>
-                </a:cubicBezTo>
-                <a:cubicBezTo>
-                  <a:pt x="765751" y="1866135"/>
-                  <a:pt x="322935" y="1836530"/>
-                  <a:pt x="0" y="1864458"/>
-                </a:cubicBezTo>
-                <a:cubicBezTo>
-                  <a:pt x="-48165" y="1733846"/>
-                  <a:pt x="27372" y="1579415"/>
-                  <a:pt x="0" y="1454277"/>
-                </a:cubicBezTo>
-                <a:cubicBezTo>
-                  <a:pt x="-27372" y="1329139"/>
-                  <a:pt x="45150" y="1167508"/>
-                  <a:pt x="0" y="988163"/>
-                </a:cubicBezTo>
-                <a:cubicBezTo>
-                  <a:pt x="-45150" y="808818"/>
-                  <a:pt x="5885" y="774926"/>
-                  <a:pt x="0" y="577982"/>
-                </a:cubicBezTo>
-                <a:cubicBezTo>
-                  <a:pt x="-5885" y="381038"/>
-                  <a:pt x="63009" y="241799"/>
-                  <a:pt x="0" y="0"/>
-                </a:cubicBezTo>
-                <a:close/>
-              </a:path>
-              <a:path w="5816635" h="1864458" stroke="0" extrusionOk="0">
-                <a:moveTo>
-                  <a:pt x="0" y="0"/>
-                </a:moveTo>
-                <a:cubicBezTo>
-                  <a:pt x="162414" y="-8056"/>
-                  <a:pt x="449027" y="53607"/>
-                  <a:pt x="581664" y="0"/>
-                </a:cubicBezTo>
-                <a:cubicBezTo>
-                  <a:pt x="714301" y="-53607"/>
-                  <a:pt x="973891" y="27709"/>
-                  <a:pt x="1163327" y="0"/>
-                </a:cubicBezTo>
-                <a:cubicBezTo>
-                  <a:pt x="1352763" y="-27709"/>
-                  <a:pt x="1530777" y="51802"/>
-                  <a:pt x="1803157" y="0"/>
-                </a:cubicBezTo>
-                <a:cubicBezTo>
-                  <a:pt x="2075537" y="-51802"/>
-                  <a:pt x="2046811" y="7774"/>
-                  <a:pt x="2210321" y="0"/>
-                </a:cubicBezTo>
-                <a:cubicBezTo>
-                  <a:pt x="2373831" y="-7774"/>
-                  <a:pt x="2557769" y="34228"/>
-                  <a:pt x="2791985" y="0"/>
-                </a:cubicBezTo>
-                <a:cubicBezTo>
-                  <a:pt x="3026201" y="-34228"/>
-                  <a:pt x="3250288" y="51854"/>
-                  <a:pt x="3373648" y="0"/>
-                </a:cubicBezTo>
-                <a:cubicBezTo>
-                  <a:pt x="3497008" y="-51854"/>
-                  <a:pt x="3778248" y="19985"/>
-                  <a:pt x="3955312" y="0"/>
-                </a:cubicBezTo>
-                <a:cubicBezTo>
-                  <a:pt x="4132376" y="-19985"/>
-                  <a:pt x="4226643" y="58730"/>
-                  <a:pt x="4478809" y="0"/>
-                </a:cubicBezTo>
-                <a:cubicBezTo>
-                  <a:pt x="4730975" y="-58730"/>
-                  <a:pt x="4885318" y="28336"/>
-                  <a:pt x="5002306" y="0"/>
-                </a:cubicBezTo>
-                <a:cubicBezTo>
-                  <a:pt x="5119294" y="-28336"/>
-                  <a:pt x="5628033" y="38329"/>
-                  <a:pt x="5816635" y="0"/>
-                </a:cubicBezTo>
-                <a:cubicBezTo>
-                  <a:pt x="5838897" y="224927"/>
-                  <a:pt x="5761864" y="247974"/>
-                  <a:pt x="5816635" y="466115"/>
-                </a:cubicBezTo>
-                <a:cubicBezTo>
-                  <a:pt x="5871406" y="684256"/>
-                  <a:pt x="5772356" y="835394"/>
-                  <a:pt x="5816635" y="950874"/>
-                </a:cubicBezTo>
-                <a:cubicBezTo>
-                  <a:pt x="5860914" y="1066354"/>
-                  <a:pt x="5812461" y="1287903"/>
-                  <a:pt x="5816635" y="1416988"/>
-                </a:cubicBezTo>
-                <a:cubicBezTo>
-                  <a:pt x="5820809" y="1546073"/>
-                  <a:pt x="5772010" y="1732162"/>
-                  <a:pt x="5816635" y="1864458"/>
-                </a:cubicBezTo>
-                <a:cubicBezTo>
-                  <a:pt x="5689523" y="1919573"/>
-                  <a:pt x="5403290" y="1830348"/>
-                  <a:pt x="5293138" y="1864458"/>
-                </a:cubicBezTo>
-                <a:cubicBezTo>
-                  <a:pt x="5182986" y="1898568"/>
-                  <a:pt x="4970188" y="1837637"/>
-                  <a:pt x="4885973" y="1864458"/>
-                </a:cubicBezTo>
-                <a:cubicBezTo>
-                  <a:pt x="4801759" y="1891279"/>
-                  <a:pt x="4561115" y="1845275"/>
-                  <a:pt x="4478809" y="1864458"/>
-                </a:cubicBezTo>
-                <a:cubicBezTo>
-                  <a:pt x="4396503" y="1883641"/>
-                  <a:pt x="4204400" y="1853029"/>
-                  <a:pt x="3955312" y="1864458"/>
-                </a:cubicBezTo>
-                <a:cubicBezTo>
-                  <a:pt x="3706224" y="1875887"/>
-                  <a:pt x="3690903" y="1823323"/>
-                  <a:pt x="3548147" y="1864458"/>
-                </a:cubicBezTo>
-                <a:cubicBezTo>
-                  <a:pt x="3405392" y="1905593"/>
-                  <a:pt x="3184999" y="1858555"/>
-                  <a:pt x="3024650" y="1864458"/>
-                </a:cubicBezTo>
-                <a:cubicBezTo>
-                  <a:pt x="2864301" y="1870361"/>
-                  <a:pt x="2521864" y="1858093"/>
-                  <a:pt x="2384820" y="1864458"/>
-                </a:cubicBezTo>
-                <a:cubicBezTo>
-                  <a:pt x="2247776" y="1870823"/>
-                  <a:pt x="2140342" y="1853071"/>
-                  <a:pt x="1977656" y="1864458"/>
-                </a:cubicBezTo>
-                <a:cubicBezTo>
-                  <a:pt x="1814970" y="1875845"/>
-                  <a:pt x="1670869" y="1862012"/>
-                  <a:pt x="1395992" y="1864458"/>
-                </a:cubicBezTo>
-                <a:cubicBezTo>
-                  <a:pt x="1121115" y="1866904"/>
-                  <a:pt x="985837" y="1838816"/>
-                  <a:pt x="872495" y="1864458"/>
-                </a:cubicBezTo>
-                <a:cubicBezTo>
-                  <a:pt x="759153" y="1890100"/>
-                  <a:pt x="414394" y="1786975"/>
-                  <a:pt x="0" y="1864458"/>
-                </a:cubicBezTo>
-                <a:cubicBezTo>
-                  <a:pt x="-42978" y="1669103"/>
-                  <a:pt x="17073" y="1587203"/>
-                  <a:pt x="0" y="1416988"/>
-                </a:cubicBezTo>
-                <a:cubicBezTo>
-                  <a:pt x="-17073" y="1246773"/>
-                  <a:pt x="46205" y="1157282"/>
-                  <a:pt x="0" y="1006807"/>
-                </a:cubicBezTo>
-                <a:cubicBezTo>
-                  <a:pt x="-46205" y="856332"/>
-                  <a:pt x="17906" y="705546"/>
-                  <a:pt x="0" y="596627"/>
-                </a:cubicBezTo>
-                <a:cubicBezTo>
-                  <a:pt x="-17906" y="487708"/>
-                  <a:pt x="31863" y="196515"/>
-                  <a:pt x="0" y="0"/>
-                </a:cubicBezTo>
-                <a:close/>
-              </a:path>
-            </a:pathLst>
-          </a:custGeom>
-          <a:solidFill>
-            <a:schemeClr val="tx1">
-              <a:lumMod val="75000"/>
-              <a:lumOff val="25000"/>
-              <a:alpha val="93000"/>
-            </a:schemeClr>
-          </a:solidFill>
-          <a:ln w="76200" cmpd="tri">
-            <a:solidFill>
-              <a:schemeClr val="tx1">
-                <a:lumMod val="75000"/>
-                <a:lumOff val="25000"/>
-                <a:alpha val="93000"/>
-              </a:schemeClr>
-            </a:solidFill>
-            <a:extLst>
-              <a:ext uri="{C807C97D-BFC1-408E-A445-0C87EB9F89A2}">
-                <ask:lineSketchStyleProps xmlns:ask="http://schemas.microsoft.com/office/drawing/2018/sketchyshapes" sd="3856269466">
-                  <a:prstGeom prst="rect">
-                    <a:avLst/>
-                  </a:prstGeom>
-                  <ask:type>
-                    <ask:lineSketchScribble/>
-                  </ask:type>
-                </ask:lineSketchStyleProps>
-              </a:ext>
-            </a:extLst>
-          </a:ln>
-        </p:spPr>
-        <p:style>
-          <a:lnRef idx="2">
-            <a:schemeClr val="accent1">
-              <a:shade val="50000"/>
-            </a:schemeClr>
-          </a:lnRef>
-          <a:fillRef idx="1">
-            <a:schemeClr val="accent1"/>
-          </a:fillRef>
-          <a:effectRef idx="0">
-            <a:schemeClr val="accent1"/>
-          </a:effectRef>
-          <a:fontRef idx="minor">
-            <a:schemeClr val="lt1"/>
-          </a:fontRef>
-        </p:style>
-        <p:txBody>
-          <a:bodyPr rtlCol="0" anchor="ctr"/>
-          <a:lstStyle/>
-          <a:p>
-            <a:pPr algn="ctr"/>
-            <a:endParaRPr lang="en-US"/>
-          </a:p>
-        </p:txBody>
-      </p:sp>
     </p:spTree>
     <p:extLst>
       <p:ext uri="{BB962C8B-B14F-4D97-AF65-F5344CB8AC3E}">
@@ -8485,83 +7961,562 @@
       </p:grpSpPr>
       <p:sp>
         <p:nvSpPr>
-          <p:cNvPr id="2" name="Title 1">
-            <a:extLst>
-              <a:ext uri="{FF2B5EF4-FFF2-40B4-BE49-F238E27FC236}">
-                <a16:creationId xmlns:a16="http://schemas.microsoft.com/office/drawing/2014/main" id="{96F65F78-2480-4993-A891-65290FC1A21F}"/>
-              </a:ext>
-            </a:extLst>
-          </p:cNvPr>
-          <p:cNvSpPr>
-            <a:spLocks noGrp="1"/>
-          </p:cNvSpPr>
-          <p:nvPr>
-            <p:ph type="title"/>
-          </p:nvPr>
+          <p:cNvPr id="6" name="Rectangle 5">
+            <a:extLst>
+              <a:ext uri="{FF2B5EF4-FFF2-40B4-BE49-F238E27FC236}">
+                <a16:creationId xmlns:a16="http://schemas.microsoft.com/office/drawing/2014/main" id="{982EA1CC-F7DB-4322-9D3C-A7679A253166}"/>
+              </a:ext>
+            </a:extLst>
+          </p:cNvPr>
+          <p:cNvSpPr/>
+          <p:nvPr/>
         </p:nvSpPr>
-        <p:spPr/>
+        <p:spPr>
+          <a:xfrm>
+            <a:off x="1280458" y="2164309"/>
+            <a:ext cx="2112982" cy="1078470"/>
+          </a:xfrm>
+          <a:custGeom>
+            <a:avLst/>
+            <a:gdLst>
+              <a:gd name="connsiteX0" fmla="*/ 0 w 2112982"/>
+              <a:gd name="connsiteY0" fmla="*/ 0 h 1078470"/>
+              <a:gd name="connsiteX1" fmla="*/ 570505 w 2112982"/>
+              <a:gd name="connsiteY1" fmla="*/ 0 h 1078470"/>
+              <a:gd name="connsiteX2" fmla="*/ 1141010 w 2112982"/>
+              <a:gd name="connsiteY2" fmla="*/ 0 h 1078470"/>
+              <a:gd name="connsiteX3" fmla="*/ 1648126 w 2112982"/>
+              <a:gd name="connsiteY3" fmla="*/ 0 h 1078470"/>
+              <a:gd name="connsiteX4" fmla="*/ 2112982 w 2112982"/>
+              <a:gd name="connsiteY4" fmla="*/ 0 h 1078470"/>
+              <a:gd name="connsiteX5" fmla="*/ 2112982 w 2112982"/>
+              <a:gd name="connsiteY5" fmla="*/ 517666 h 1078470"/>
+              <a:gd name="connsiteX6" fmla="*/ 2112982 w 2112982"/>
+              <a:gd name="connsiteY6" fmla="*/ 1078470 h 1078470"/>
+              <a:gd name="connsiteX7" fmla="*/ 1563607 w 2112982"/>
+              <a:gd name="connsiteY7" fmla="*/ 1078470 h 1078470"/>
+              <a:gd name="connsiteX8" fmla="*/ 993102 w 2112982"/>
+              <a:gd name="connsiteY8" fmla="*/ 1078470 h 1078470"/>
+              <a:gd name="connsiteX9" fmla="*/ 507116 w 2112982"/>
+              <a:gd name="connsiteY9" fmla="*/ 1078470 h 1078470"/>
+              <a:gd name="connsiteX10" fmla="*/ 0 w 2112982"/>
+              <a:gd name="connsiteY10" fmla="*/ 1078470 h 1078470"/>
+              <a:gd name="connsiteX11" fmla="*/ 0 w 2112982"/>
+              <a:gd name="connsiteY11" fmla="*/ 539235 h 1078470"/>
+              <a:gd name="connsiteX12" fmla="*/ 0 w 2112982"/>
+              <a:gd name="connsiteY12" fmla="*/ 0 h 1078470"/>
+            </a:gdLst>
+            <a:ahLst/>
+            <a:cxnLst>
+              <a:cxn ang="0">
+                <a:pos x="connsiteX0" y="connsiteY0"/>
+              </a:cxn>
+              <a:cxn ang="0">
+                <a:pos x="connsiteX1" y="connsiteY1"/>
+              </a:cxn>
+              <a:cxn ang="0">
+                <a:pos x="connsiteX2" y="connsiteY2"/>
+              </a:cxn>
+              <a:cxn ang="0">
+                <a:pos x="connsiteX3" y="connsiteY3"/>
+              </a:cxn>
+              <a:cxn ang="0">
+                <a:pos x="connsiteX4" y="connsiteY4"/>
+              </a:cxn>
+              <a:cxn ang="0">
+                <a:pos x="connsiteX5" y="connsiteY5"/>
+              </a:cxn>
+              <a:cxn ang="0">
+                <a:pos x="connsiteX6" y="connsiteY6"/>
+              </a:cxn>
+              <a:cxn ang="0">
+                <a:pos x="connsiteX7" y="connsiteY7"/>
+              </a:cxn>
+              <a:cxn ang="0">
+                <a:pos x="connsiteX8" y="connsiteY8"/>
+              </a:cxn>
+              <a:cxn ang="0">
+                <a:pos x="connsiteX9" y="connsiteY9"/>
+              </a:cxn>
+              <a:cxn ang="0">
+                <a:pos x="connsiteX10" y="connsiteY10"/>
+              </a:cxn>
+              <a:cxn ang="0">
+                <a:pos x="connsiteX11" y="connsiteY11"/>
+              </a:cxn>
+              <a:cxn ang="0">
+                <a:pos x="connsiteX12" y="connsiteY12"/>
+              </a:cxn>
+            </a:cxnLst>
+            <a:rect l="l" t="t" r="r" b="b"/>
+            <a:pathLst>
+              <a:path w="2112982" h="1078470" fill="none" extrusionOk="0">
+                <a:moveTo>
+                  <a:pt x="0" y="0"/>
+                </a:moveTo>
+                <a:cubicBezTo>
+                  <a:pt x="173530" y="-56369"/>
+                  <a:pt x="455668" y="9630"/>
+                  <a:pt x="570505" y="0"/>
+                </a:cubicBezTo>
+                <a:cubicBezTo>
+                  <a:pt x="685343" y="-9630"/>
+                  <a:pt x="1009560" y="8237"/>
+                  <a:pt x="1141010" y="0"/>
+                </a:cubicBezTo>
+                <a:cubicBezTo>
+                  <a:pt x="1272461" y="-8237"/>
+                  <a:pt x="1472703" y="28530"/>
+                  <a:pt x="1648126" y="0"/>
+                </a:cubicBezTo>
+                <a:cubicBezTo>
+                  <a:pt x="1823549" y="-28530"/>
+                  <a:pt x="1933090" y="24380"/>
+                  <a:pt x="2112982" y="0"/>
+                </a:cubicBezTo>
+                <a:cubicBezTo>
+                  <a:pt x="2159893" y="157806"/>
+                  <a:pt x="2081451" y="365969"/>
+                  <a:pt x="2112982" y="517666"/>
+                </a:cubicBezTo>
+                <a:cubicBezTo>
+                  <a:pt x="2144513" y="669363"/>
+                  <a:pt x="2062896" y="860589"/>
+                  <a:pt x="2112982" y="1078470"/>
+                </a:cubicBezTo>
+                <a:cubicBezTo>
+                  <a:pt x="2000554" y="1129151"/>
+                  <a:pt x="1730744" y="1066335"/>
+                  <a:pt x="1563607" y="1078470"/>
+                </a:cubicBezTo>
+                <a:cubicBezTo>
+                  <a:pt x="1396470" y="1090605"/>
+                  <a:pt x="1228544" y="1067992"/>
+                  <a:pt x="993102" y="1078470"/>
+                </a:cubicBezTo>
+                <a:cubicBezTo>
+                  <a:pt x="757660" y="1088948"/>
+                  <a:pt x="718839" y="1049067"/>
+                  <a:pt x="507116" y="1078470"/>
+                </a:cubicBezTo>
+                <a:cubicBezTo>
+                  <a:pt x="295393" y="1107873"/>
+                  <a:pt x="144592" y="1044116"/>
+                  <a:pt x="0" y="1078470"/>
+                </a:cubicBezTo>
+                <a:cubicBezTo>
+                  <a:pt x="-37471" y="846470"/>
+                  <a:pt x="64208" y="671693"/>
+                  <a:pt x="0" y="539235"/>
+                </a:cubicBezTo>
+                <a:cubicBezTo>
+                  <a:pt x="-64208" y="406778"/>
+                  <a:pt x="41917" y="123920"/>
+                  <a:pt x="0" y="0"/>
+                </a:cubicBezTo>
+                <a:close/>
+              </a:path>
+              <a:path w="2112982" h="1078470" stroke="0" extrusionOk="0">
+                <a:moveTo>
+                  <a:pt x="0" y="0"/>
+                </a:moveTo>
+                <a:cubicBezTo>
+                  <a:pt x="149648" y="-56771"/>
+                  <a:pt x="288603" y="21141"/>
+                  <a:pt x="528246" y="0"/>
+                </a:cubicBezTo>
+                <a:cubicBezTo>
+                  <a:pt x="767889" y="-21141"/>
+                  <a:pt x="874197" y="63296"/>
+                  <a:pt x="1056491" y="0"/>
+                </a:cubicBezTo>
+                <a:cubicBezTo>
+                  <a:pt x="1238786" y="-63296"/>
+                  <a:pt x="1338320" y="3197"/>
+                  <a:pt x="1605866" y="0"/>
+                </a:cubicBezTo>
+                <a:cubicBezTo>
+                  <a:pt x="1873413" y="-3197"/>
+                  <a:pt x="1995057" y="57473"/>
+                  <a:pt x="2112982" y="0"/>
+                </a:cubicBezTo>
+                <a:cubicBezTo>
+                  <a:pt x="2117714" y="126339"/>
+                  <a:pt x="2077669" y="333876"/>
+                  <a:pt x="2112982" y="539235"/>
+                </a:cubicBezTo>
+                <a:cubicBezTo>
+                  <a:pt x="2148295" y="744595"/>
+                  <a:pt x="2059471" y="922363"/>
+                  <a:pt x="2112982" y="1078470"/>
+                </a:cubicBezTo>
+                <a:cubicBezTo>
+                  <a:pt x="1907158" y="1096543"/>
+                  <a:pt x="1780833" y="1035156"/>
+                  <a:pt x="1605866" y="1078470"/>
+                </a:cubicBezTo>
+                <a:cubicBezTo>
+                  <a:pt x="1430899" y="1121784"/>
+                  <a:pt x="1268585" y="1022041"/>
+                  <a:pt x="1098751" y="1078470"/>
+                </a:cubicBezTo>
+                <a:cubicBezTo>
+                  <a:pt x="928917" y="1134899"/>
+                  <a:pt x="795551" y="1042949"/>
+                  <a:pt x="528246" y="1078470"/>
+                </a:cubicBezTo>
+                <a:cubicBezTo>
+                  <a:pt x="260942" y="1113991"/>
+                  <a:pt x="117306" y="1063679"/>
+                  <a:pt x="0" y="1078470"/>
+                </a:cubicBezTo>
+                <a:cubicBezTo>
+                  <a:pt x="-41476" y="877212"/>
+                  <a:pt x="8313" y="704480"/>
+                  <a:pt x="0" y="550020"/>
+                </a:cubicBezTo>
+                <a:cubicBezTo>
+                  <a:pt x="-8313" y="395560"/>
+                  <a:pt x="7892" y="208131"/>
+                  <a:pt x="0" y="0"/>
+                </a:cubicBezTo>
+                <a:close/>
+              </a:path>
+            </a:pathLst>
+          </a:custGeom>
+          <a:solidFill>
+            <a:schemeClr val="tx1">
+              <a:lumMod val="75000"/>
+              <a:lumOff val="25000"/>
+              <a:alpha val="93000"/>
+            </a:schemeClr>
+          </a:solidFill>
+          <a:ln w="76200" cmpd="tri">
+            <a:solidFill>
+              <a:schemeClr val="tx1">
+                <a:lumMod val="75000"/>
+                <a:lumOff val="25000"/>
+                <a:alpha val="93000"/>
+              </a:schemeClr>
+            </a:solidFill>
+            <a:extLst>
+              <a:ext uri="{C807C97D-BFC1-408E-A445-0C87EB9F89A2}">
+                <ask:lineSketchStyleProps xmlns:ask="http://schemas.microsoft.com/office/drawing/2018/sketchyshapes" sd="3856269466">
+                  <a:prstGeom prst="rect">
+                    <a:avLst/>
+                  </a:prstGeom>
+                  <ask:type>
+                    <ask:lineSketchScribble/>
+                  </ask:type>
+                </ask:lineSketchStyleProps>
+              </a:ext>
+            </a:extLst>
+          </a:ln>
+        </p:spPr>
+        <p:style>
+          <a:lnRef idx="2">
+            <a:schemeClr val="accent1">
+              <a:shade val="50000"/>
+            </a:schemeClr>
+          </a:lnRef>
+          <a:fillRef idx="1">
+            <a:schemeClr val="accent1"/>
+          </a:fillRef>
+          <a:effectRef idx="0">
+            <a:schemeClr val="accent1"/>
+          </a:effectRef>
+          <a:fontRef idx="minor">
+            <a:schemeClr val="lt1"/>
+          </a:fontRef>
+        </p:style>
         <p:txBody>
-          <a:bodyPr/>
+          <a:bodyPr rtlCol="0" anchor="ctr"/>
           <a:lstStyle/>
           <a:p>
+            <a:pPr algn="ctr"/>
             <a:endParaRPr lang="en-US"/>
           </a:p>
         </p:txBody>
       </p:sp>
       <p:sp>
         <p:nvSpPr>
-          <p:cNvPr id="3" name="Content Placeholder 2">
-            <a:extLst>
-              <a:ext uri="{FF2B5EF4-FFF2-40B4-BE49-F238E27FC236}">
-                <a16:creationId xmlns:a16="http://schemas.microsoft.com/office/drawing/2014/main" id="{3DD52A8D-1B7D-4956-A239-0CA691314306}"/>
-              </a:ext>
-            </a:extLst>
-          </p:cNvPr>
-          <p:cNvSpPr>
-            <a:spLocks noGrp="1"/>
-          </p:cNvSpPr>
-          <p:nvPr>
-            <p:ph idx="1"/>
-          </p:nvPr>
+          <p:cNvPr id="5" name="Rectangle 4">
+            <a:extLst>
+              <a:ext uri="{FF2B5EF4-FFF2-40B4-BE49-F238E27FC236}">
+                <a16:creationId xmlns:a16="http://schemas.microsoft.com/office/drawing/2014/main" id="{C5A1E905-4D80-41BE-9022-C7308E1E1099}"/>
+              </a:ext>
+            </a:extLst>
+          </p:cNvPr>
+          <p:cNvSpPr/>
+          <p:nvPr/>
         </p:nvSpPr>
-        <p:spPr/>
+        <p:spPr>
+          <a:xfrm>
+            <a:off x="1280458" y="2233690"/>
+            <a:ext cx="2112982" cy="1078470"/>
+          </a:xfrm>
+          <a:custGeom>
+            <a:avLst/>
+            <a:gdLst>
+              <a:gd name="connsiteX0" fmla="*/ 0 w 2112982"/>
+              <a:gd name="connsiteY0" fmla="*/ 0 h 1078470"/>
+              <a:gd name="connsiteX1" fmla="*/ 570505 w 2112982"/>
+              <a:gd name="connsiteY1" fmla="*/ 0 h 1078470"/>
+              <a:gd name="connsiteX2" fmla="*/ 1141010 w 2112982"/>
+              <a:gd name="connsiteY2" fmla="*/ 0 h 1078470"/>
+              <a:gd name="connsiteX3" fmla="*/ 1648126 w 2112982"/>
+              <a:gd name="connsiteY3" fmla="*/ 0 h 1078470"/>
+              <a:gd name="connsiteX4" fmla="*/ 2112982 w 2112982"/>
+              <a:gd name="connsiteY4" fmla="*/ 0 h 1078470"/>
+              <a:gd name="connsiteX5" fmla="*/ 2112982 w 2112982"/>
+              <a:gd name="connsiteY5" fmla="*/ 517666 h 1078470"/>
+              <a:gd name="connsiteX6" fmla="*/ 2112982 w 2112982"/>
+              <a:gd name="connsiteY6" fmla="*/ 1078470 h 1078470"/>
+              <a:gd name="connsiteX7" fmla="*/ 1563607 w 2112982"/>
+              <a:gd name="connsiteY7" fmla="*/ 1078470 h 1078470"/>
+              <a:gd name="connsiteX8" fmla="*/ 993102 w 2112982"/>
+              <a:gd name="connsiteY8" fmla="*/ 1078470 h 1078470"/>
+              <a:gd name="connsiteX9" fmla="*/ 507116 w 2112982"/>
+              <a:gd name="connsiteY9" fmla="*/ 1078470 h 1078470"/>
+              <a:gd name="connsiteX10" fmla="*/ 0 w 2112982"/>
+              <a:gd name="connsiteY10" fmla="*/ 1078470 h 1078470"/>
+              <a:gd name="connsiteX11" fmla="*/ 0 w 2112982"/>
+              <a:gd name="connsiteY11" fmla="*/ 539235 h 1078470"/>
+              <a:gd name="connsiteX12" fmla="*/ 0 w 2112982"/>
+              <a:gd name="connsiteY12" fmla="*/ 0 h 1078470"/>
+            </a:gdLst>
+            <a:ahLst/>
+            <a:cxnLst>
+              <a:cxn ang="0">
+                <a:pos x="connsiteX0" y="connsiteY0"/>
+              </a:cxn>
+              <a:cxn ang="0">
+                <a:pos x="connsiteX1" y="connsiteY1"/>
+              </a:cxn>
+              <a:cxn ang="0">
+                <a:pos x="connsiteX2" y="connsiteY2"/>
+              </a:cxn>
+              <a:cxn ang="0">
+                <a:pos x="connsiteX3" y="connsiteY3"/>
+              </a:cxn>
+              <a:cxn ang="0">
+                <a:pos x="connsiteX4" y="connsiteY4"/>
+              </a:cxn>
+              <a:cxn ang="0">
+                <a:pos x="connsiteX5" y="connsiteY5"/>
+              </a:cxn>
+              <a:cxn ang="0">
+                <a:pos x="connsiteX6" y="connsiteY6"/>
+              </a:cxn>
+              <a:cxn ang="0">
+                <a:pos x="connsiteX7" y="connsiteY7"/>
+              </a:cxn>
+              <a:cxn ang="0">
+                <a:pos x="connsiteX8" y="connsiteY8"/>
+              </a:cxn>
+              <a:cxn ang="0">
+                <a:pos x="connsiteX9" y="connsiteY9"/>
+              </a:cxn>
+              <a:cxn ang="0">
+                <a:pos x="connsiteX10" y="connsiteY10"/>
+              </a:cxn>
+              <a:cxn ang="0">
+                <a:pos x="connsiteX11" y="connsiteY11"/>
+              </a:cxn>
+              <a:cxn ang="0">
+                <a:pos x="connsiteX12" y="connsiteY12"/>
+              </a:cxn>
+            </a:cxnLst>
+            <a:rect l="l" t="t" r="r" b="b"/>
+            <a:pathLst>
+              <a:path w="2112982" h="1078470" fill="none" extrusionOk="0">
+                <a:moveTo>
+                  <a:pt x="0" y="0"/>
+                </a:moveTo>
+                <a:cubicBezTo>
+                  <a:pt x="173530" y="-5024"/>
+                  <a:pt x="455668" y="-18895"/>
+                  <a:pt x="570505" y="0"/>
+                </a:cubicBezTo>
+                <a:cubicBezTo>
+                  <a:pt x="685343" y="18895"/>
+                  <a:pt x="1009560" y="-8878"/>
+                  <a:pt x="1141010" y="0"/>
+                </a:cubicBezTo>
+                <a:cubicBezTo>
+                  <a:pt x="1272461" y="8878"/>
+                  <a:pt x="1472703" y="-17110"/>
+                  <a:pt x="1648126" y="0"/>
+                </a:cubicBezTo>
+                <a:cubicBezTo>
+                  <a:pt x="1823549" y="17110"/>
+                  <a:pt x="1933090" y="10435"/>
+                  <a:pt x="2112982" y="0"/>
+                </a:cubicBezTo>
+                <a:cubicBezTo>
+                  <a:pt x="2113303" y="157806"/>
+                  <a:pt x="2117688" y="365969"/>
+                  <a:pt x="2112982" y="517666"/>
+                </a:cubicBezTo>
+                <a:cubicBezTo>
+                  <a:pt x="2108276" y="669363"/>
+                  <a:pt x="2124585" y="860589"/>
+                  <a:pt x="2112982" y="1078470"/>
+                </a:cubicBezTo>
+                <a:cubicBezTo>
+                  <a:pt x="2000554" y="1101682"/>
+                  <a:pt x="1730744" y="1082816"/>
+                  <a:pt x="1563607" y="1078470"/>
+                </a:cubicBezTo>
+                <a:cubicBezTo>
+                  <a:pt x="1396470" y="1074124"/>
+                  <a:pt x="1228544" y="1062287"/>
+                  <a:pt x="993102" y="1078470"/>
+                </a:cubicBezTo>
+                <a:cubicBezTo>
+                  <a:pt x="757660" y="1094653"/>
+                  <a:pt x="718839" y="1073366"/>
+                  <a:pt x="507116" y="1078470"/>
+                </a:cubicBezTo>
+                <a:cubicBezTo>
+                  <a:pt x="295393" y="1083574"/>
+                  <a:pt x="144592" y="1089757"/>
+                  <a:pt x="0" y="1078470"/>
+                </a:cubicBezTo>
+                <a:cubicBezTo>
+                  <a:pt x="275" y="846470"/>
+                  <a:pt x="-16677" y="671693"/>
+                  <a:pt x="0" y="539235"/>
+                </a:cubicBezTo>
+                <a:cubicBezTo>
+                  <a:pt x="16677" y="406778"/>
+                  <a:pt x="14955" y="123920"/>
+                  <a:pt x="0" y="0"/>
+                </a:cubicBezTo>
+                <a:close/>
+              </a:path>
+              <a:path w="2112982" h="1078470" stroke="0" extrusionOk="0">
+                <a:moveTo>
+                  <a:pt x="0" y="0"/>
+                </a:moveTo>
+                <a:cubicBezTo>
+                  <a:pt x="149648" y="11901"/>
+                  <a:pt x="288603" y="-15836"/>
+                  <a:pt x="528246" y="0"/>
+                </a:cubicBezTo>
+                <a:cubicBezTo>
+                  <a:pt x="767889" y="15836"/>
+                  <a:pt x="874197" y="5189"/>
+                  <a:pt x="1056491" y="0"/>
+                </a:cubicBezTo>
+                <a:cubicBezTo>
+                  <a:pt x="1238786" y="-5189"/>
+                  <a:pt x="1338320" y="8691"/>
+                  <a:pt x="1605866" y="0"/>
+                </a:cubicBezTo>
+                <a:cubicBezTo>
+                  <a:pt x="1873413" y="-8691"/>
+                  <a:pt x="1995057" y="-18594"/>
+                  <a:pt x="2112982" y="0"/>
+                </a:cubicBezTo>
+                <a:cubicBezTo>
+                  <a:pt x="2133891" y="126339"/>
+                  <a:pt x="2136985" y="333876"/>
+                  <a:pt x="2112982" y="539235"/>
+                </a:cubicBezTo>
+                <a:cubicBezTo>
+                  <a:pt x="2088979" y="744595"/>
+                  <a:pt x="2097217" y="922363"/>
+                  <a:pt x="2112982" y="1078470"/>
+                </a:cubicBezTo>
+                <a:cubicBezTo>
+                  <a:pt x="1907158" y="1081329"/>
+                  <a:pt x="1780833" y="1080797"/>
+                  <a:pt x="1605866" y="1078470"/>
+                </a:cubicBezTo>
+                <a:cubicBezTo>
+                  <a:pt x="1430899" y="1076143"/>
+                  <a:pt x="1268585" y="1077823"/>
+                  <a:pt x="1098751" y="1078470"/>
+                </a:cubicBezTo>
+                <a:cubicBezTo>
+                  <a:pt x="928917" y="1079117"/>
+                  <a:pt x="795551" y="1094294"/>
+                  <a:pt x="528246" y="1078470"/>
+                </a:cubicBezTo>
+                <a:cubicBezTo>
+                  <a:pt x="260942" y="1062646"/>
+                  <a:pt x="117306" y="1058397"/>
+                  <a:pt x="0" y="1078470"/>
+                </a:cubicBezTo>
+                <a:cubicBezTo>
+                  <a:pt x="-15054" y="877212"/>
+                  <a:pt x="-7541" y="704480"/>
+                  <a:pt x="0" y="550020"/>
+                </a:cubicBezTo>
+                <a:cubicBezTo>
+                  <a:pt x="7541" y="395560"/>
+                  <a:pt x="13392" y="208131"/>
+                  <a:pt x="0" y="0"/>
+                </a:cubicBezTo>
+                <a:close/>
+              </a:path>
+            </a:pathLst>
+          </a:custGeom>
+          <a:solidFill>
+            <a:schemeClr val="tx1">
+              <a:lumMod val="85000"/>
+              <a:lumOff val="15000"/>
+              <a:alpha val="55000"/>
+            </a:schemeClr>
+          </a:solidFill>
+          <a:ln w="76200" cmpd="tri">
+            <a:solidFill>
+              <a:schemeClr val="tx1">
+                <a:lumMod val="75000"/>
+                <a:lumOff val="25000"/>
+                <a:alpha val="61000"/>
+              </a:schemeClr>
+            </a:solidFill>
+            <a:extLst>
+              <a:ext uri="{C807C97D-BFC1-408E-A445-0C87EB9F89A2}">
+                <ask:lineSketchStyleProps xmlns:ask="http://schemas.microsoft.com/office/drawing/2018/sketchyshapes" sd="3856269466">
+                  <a:prstGeom prst="rect">
+                    <a:avLst/>
+                  </a:prstGeom>
+                  <ask:type>
+                    <ask:lineSketchFreehand/>
+                  </ask:type>
+                </ask:lineSketchStyleProps>
+              </a:ext>
+            </a:extLst>
+          </a:ln>
+        </p:spPr>
+        <p:style>
+          <a:lnRef idx="2">
+            <a:schemeClr val="accent1">
+              <a:shade val="50000"/>
+            </a:schemeClr>
+          </a:lnRef>
+          <a:fillRef idx="1">
+            <a:schemeClr val="accent1"/>
+          </a:fillRef>
+          <a:effectRef idx="0">
+            <a:schemeClr val="accent1"/>
+          </a:effectRef>
+          <a:fontRef idx="minor">
+            <a:schemeClr val="lt1"/>
+          </a:fontRef>
+        </p:style>
         <p:txBody>
-          <a:bodyPr/>
+          <a:bodyPr rtlCol="0" anchor="ctr"/>
           <a:lstStyle/>
           <a:p>
-            <a:endParaRPr lang="en-US" dirty="0"/>
+            <a:pPr algn="ctr"/>
+            <a:endParaRPr lang="en-US"/>
           </a:p>
         </p:txBody>
       </p:sp>
-      <p:pic>
-        <p:nvPicPr>
-          <p:cNvPr id="4" name="Picture 3">
-            <a:extLst>
-              <a:ext uri="{FF2B5EF4-FFF2-40B4-BE49-F238E27FC236}">
-                <a16:creationId xmlns:a16="http://schemas.microsoft.com/office/drawing/2014/main" id="{842A2AF7-6430-4983-9427-6C4E1DD37277}"/>
-              </a:ext>
-            </a:extLst>
-          </p:cNvPr>
-          <p:cNvPicPr>
-            <a:picLocks noChangeAspect="1"/>
-          </p:cNvPicPr>
-          <p:nvPr/>
-        </p:nvPicPr>
-        <p:blipFill rotWithShape="1">
-          <a:blip r:embed="rId2"/>
-          <a:srcRect l="3273" r="7997" b="27254"/>
-          <a:stretch/>
-        </p:blipFill>
-        <p:spPr>
-          <a:xfrm>
-            <a:off x="1142720" y="3505559"/>
-            <a:ext cx="2339516" cy="1740681"/>
-          </a:xfrm>
-          <a:prstGeom prst="rect">
-            <a:avLst/>
-          </a:prstGeom>
-        </p:spPr>
-      </p:pic>
     </p:spTree>
     <p:extLst>
       <p:ext uri="{BB962C8B-B14F-4D97-AF65-F5344CB8AC3E}">

</xml_diff>

<commit_message>
Added smart sentence separation into the parser
</commit_message>
<xml_diff>
--- a/ui designs.pptx
+++ b/ui designs.pptx
@@ -262,7 +262,7 @@
           <a:p>
             <a:fld id="{31E70AC4-149A-438B-99DD-22F666C1306E}" type="datetimeFigureOut">
               <a:rPr lang="en-US" smtClean="0"/>
-              <a:t>4/3/2020</a:t>
+              <a:t>4/4/2020</a:t>
             </a:fld>
             <a:endParaRPr lang="en-US"/>
           </a:p>
@@ -460,7 +460,7 @@
           <a:p>
             <a:fld id="{31E70AC4-149A-438B-99DD-22F666C1306E}" type="datetimeFigureOut">
               <a:rPr lang="en-US" smtClean="0"/>
-              <a:t>4/3/2020</a:t>
+              <a:t>4/4/2020</a:t>
             </a:fld>
             <a:endParaRPr lang="en-US"/>
           </a:p>
@@ -668,7 +668,7 @@
           <a:p>
             <a:fld id="{31E70AC4-149A-438B-99DD-22F666C1306E}" type="datetimeFigureOut">
               <a:rPr lang="en-US" smtClean="0"/>
-              <a:t>4/3/2020</a:t>
+              <a:t>4/4/2020</a:t>
             </a:fld>
             <a:endParaRPr lang="en-US"/>
           </a:p>
@@ -866,7 +866,7 @@
           <a:p>
             <a:fld id="{31E70AC4-149A-438B-99DD-22F666C1306E}" type="datetimeFigureOut">
               <a:rPr lang="en-US" smtClean="0"/>
-              <a:t>4/3/2020</a:t>
+              <a:t>4/4/2020</a:t>
             </a:fld>
             <a:endParaRPr lang="en-US"/>
           </a:p>
@@ -1141,7 +1141,7 @@
           <a:p>
             <a:fld id="{31E70AC4-149A-438B-99DD-22F666C1306E}" type="datetimeFigureOut">
               <a:rPr lang="en-US" smtClean="0"/>
-              <a:t>4/3/2020</a:t>
+              <a:t>4/4/2020</a:t>
             </a:fld>
             <a:endParaRPr lang="en-US"/>
           </a:p>
@@ -1406,7 +1406,7 @@
           <a:p>
             <a:fld id="{31E70AC4-149A-438B-99DD-22F666C1306E}" type="datetimeFigureOut">
               <a:rPr lang="en-US" smtClean="0"/>
-              <a:t>4/3/2020</a:t>
+              <a:t>4/4/2020</a:t>
             </a:fld>
             <a:endParaRPr lang="en-US"/>
           </a:p>
@@ -1818,7 +1818,7 @@
           <a:p>
             <a:fld id="{31E70AC4-149A-438B-99DD-22F666C1306E}" type="datetimeFigureOut">
               <a:rPr lang="en-US" smtClean="0"/>
-              <a:t>4/3/2020</a:t>
+              <a:t>4/4/2020</a:t>
             </a:fld>
             <a:endParaRPr lang="en-US"/>
           </a:p>
@@ -1959,7 +1959,7 @@
           <a:p>
             <a:fld id="{31E70AC4-149A-438B-99DD-22F666C1306E}" type="datetimeFigureOut">
               <a:rPr lang="en-US" smtClean="0"/>
-              <a:t>4/3/2020</a:t>
+              <a:t>4/4/2020</a:t>
             </a:fld>
             <a:endParaRPr lang="en-US"/>
           </a:p>
@@ -2072,7 +2072,7 @@
           <a:p>
             <a:fld id="{31E70AC4-149A-438B-99DD-22F666C1306E}" type="datetimeFigureOut">
               <a:rPr lang="en-US" smtClean="0"/>
-              <a:t>4/3/2020</a:t>
+              <a:t>4/4/2020</a:t>
             </a:fld>
             <a:endParaRPr lang="en-US"/>
           </a:p>
@@ -2383,7 +2383,7 @@
           <a:p>
             <a:fld id="{31E70AC4-149A-438B-99DD-22F666C1306E}" type="datetimeFigureOut">
               <a:rPr lang="en-US" smtClean="0"/>
-              <a:t>4/3/2020</a:t>
+              <a:t>4/4/2020</a:t>
             </a:fld>
             <a:endParaRPr lang="en-US"/>
           </a:p>
@@ -2671,7 +2671,7 @@
           <a:p>
             <a:fld id="{31E70AC4-149A-438B-99DD-22F666C1306E}" type="datetimeFigureOut">
               <a:rPr lang="en-US" smtClean="0"/>
-              <a:t>4/3/2020</a:t>
+              <a:t>4/4/2020</a:t>
             </a:fld>
             <a:endParaRPr lang="en-US"/>
           </a:p>
@@ -2912,7 +2912,7 @@
           <a:p>
             <a:fld id="{31E70AC4-149A-438B-99DD-22F666C1306E}" type="datetimeFigureOut">
               <a:rPr lang="en-US" smtClean="0"/>
-              <a:t>4/3/2020</a:t>
+              <a:t>4/4/2020</a:t>
             </a:fld>
             <a:endParaRPr lang="en-US"/>
           </a:p>
@@ -4124,7 +4124,7 @@
         </p:nvGrpSpPr>
         <p:grpSpPr>
           <a:xfrm>
-            <a:off x="4894993" y="3581735"/>
+            <a:off x="4837765" y="3499820"/>
             <a:ext cx="3892624" cy="2808353"/>
             <a:chOff x="4894993" y="3581735"/>
             <a:chExt cx="3892624" cy="2808353"/>
@@ -5011,6 +5011,251 @@
           </p:txBody>
         </p:sp>
       </p:grpSp>
+      <p:sp>
+        <p:nvSpPr>
+          <p:cNvPr id="28" name="Rectangle: Rounded Corners 27">
+            <a:extLst>
+              <a:ext uri="{FF2B5EF4-FFF2-40B4-BE49-F238E27FC236}">
+                <a16:creationId xmlns:a16="http://schemas.microsoft.com/office/drawing/2014/main" id="{F48A1BB4-8A11-4A31-86E8-C9050F81FD12}"/>
+              </a:ext>
+            </a:extLst>
+          </p:cNvPr>
+          <p:cNvSpPr/>
+          <p:nvPr/>
+        </p:nvSpPr>
+        <p:spPr>
+          <a:xfrm rot="21429238">
+            <a:off x="5387809" y="4131664"/>
+            <a:ext cx="884048" cy="258507"/>
+          </a:xfrm>
+          <a:custGeom>
+            <a:avLst/>
+            <a:gdLst>
+              <a:gd name="connsiteX0" fmla="*/ 0 w 884048"/>
+              <a:gd name="connsiteY0" fmla="*/ 121263 h 258507"/>
+              <a:gd name="connsiteX1" fmla="*/ 121263 w 884048"/>
+              <a:gd name="connsiteY1" fmla="*/ 0 h 258507"/>
+              <a:gd name="connsiteX2" fmla="*/ 435609 w 884048"/>
+              <a:gd name="connsiteY2" fmla="*/ 0 h 258507"/>
+              <a:gd name="connsiteX3" fmla="*/ 762785 w 884048"/>
+              <a:gd name="connsiteY3" fmla="*/ 0 h 258507"/>
+              <a:gd name="connsiteX4" fmla="*/ 884048 w 884048"/>
+              <a:gd name="connsiteY4" fmla="*/ 121263 h 258507"/>
+              <a:gd name="connsiteX5" fmla="*/ 884048 w 884048"/>
+              <a:gd name="connsiteY5" fmla="*/ 137244 h 258507"/>
+              <a:gd name="connsiteX6" fmla="*/ 762785 w 884048"/>
+              <a:gd name="connsiteY6" fmla="*/ 258507 h 258507"/>
+              <a:gd name="connsiteX7" fmla="*/ 435609 w 884048"/>
+              <a:gd name="connsiteY7" fmla="*/ 258507 h 258507"/>
+              <a:gd name="connsiteX8" fmla="*/ 121263 w 884048"/>
+              <a:gd name="connsiteY8" fmla="*/ 258507 h 258507"/>
+              <a:gd name="connsiteX9" fmla="*/ 0 w 884048"/>
+              <a:gd name="connsiteY9" fmla="*/ 137244 h 258507"/>
+              <a:gd name="connsiteX10" fmla="*/ 0 w 884048"/>
+              <a:gd name="connsiteY10" fmla="*/ 121263 h 258507"/>
+            </a:gdLst>
+            <a:ahLst/>
+            <a:cxnLst>
+              <a:cxn ang="0">
+                <a:pos x="connsiteX0" y="connsiteY0"/>
+              </a:cxn>
+              <a:cxn ang="0">
+                <a:pos x="connsiteX1" y="connsiteY1"/>
+              </a:cxn>
+              <a:cxn ang="0">
+                <a:pos x="connsiteX2" y="connsiteY2"/>
+              </a:cxn>
+              <a:cxn ang="0">
+                <a:pos x="connsiteX3" y="connsiteY3"/>
+              </a:cxn>
+              <a:cxn ang="0">
+                <a:pos x="connsiteX4" y="connsiteY4"/>
+              </a:cxn>
+              <a:cxn ang="0">
+                <a:pos x="connsiteX5" y="connsiteY5"/>
+              </a:cxn>
+              <a:cxn ang="0">
+                <a:pos x="connsiteX6" y="connsiteY6"/>
+              </a:cxn>
+              <a:cxn ang="0">
+                <a:pos x="connsiteX7" y="connsiteY7"/>
+              </a:cxn>
+              <a:cxn ang="0">
+                <a:pos x="connsiteX8" y="connsiteY8"/>
+              </a:cxn>
+              <a:cxn ang="0">
+                <a:pos x="connsiteX9" y="connsiteY9"/>
+              </a:cxn>
+              <a:cxn ang="0">
+                <a:pos x="connsiteX10" y="connsiteY10"/>
+              </a:cxn>
+            </a:cxnLst>
+            <a:rect l="l" t="t" r="r" b="b"/>
+            <a:pathLst>
+              <a:path w="884048" h="258507" fill="none" extrusionOk="0">
+                <a:moveTo>
+                  <a:pt x="0" y="121263"/>
+                </a:moveTo>
+                <a:cubicBezTo>
+                  <a:pt x="-3915" y="57645"/>
+                  <a:pt x="57540" y="14236"/>
+                  <a:pt x="121263" y="0"/>
+                </a:cubicBezTo>
+                <a:cubicBezTo>
+                  <a:pt x="239088" y="-32183"/>
+                  <a:pt x="369146" y="26840"/>
+                  <a:pt x="435609" y="0"/>
+                </a:cubicBezTo>
+                <a:cubicBezTo>
+                  <a:pt x="502072" y="-26840"/>
+                  <a:pt x="608025" y="17722"/>
+                  <a:pt x="762785" y="0"/>
+                </a:cubicBezTo>
+                <a:cubicBezTo>
+                  <a:pt x="823593" y="651"/>
+                  <a:pt x="874163" y="52364"/>
+                  <a:pt x="884048" y="121263"/>
+                </a:cubicBezTo>
+                <a:cubicBezTo>
+                  <a:pt x="885402" y="127853"/>
+                  <a:pt x="882209" y="130839"/>
+                  <a:pt x="884048" y="137244"/>
+                </a:cubicBezTo>
+                <a:cubicBezTo>
+                  <a:pt x="884682" y="200944"/>
+                  <a:pt x="832894" y="256941"/>
+                  <a:pt x="762785" y="258507"/>
+                </a:cubicBezTo>
+                <a:cubicBezTo>
+                  <a:pt x="691347" y="259922"/>
+                  <a:pt x="544360" y="251502"/>
+                  <a:pt x="435609" y="258507"/>
+                </a:cubicBezTo>
+                <a:cubicBezTo>
+                  <a:pt x="326858" y="265512"/>
+                  <a:pt x="275914" y="233620"/>
+                  <a:pt x="121263" y="258507"/>
+                </a:cubicBezTo>
+                <a:cubicBezTo>
+                  <a:pt x="53468" y="250870"/>
+                  <a:pt x="15401" y="202322"/>
+                  <a:pt x="0" y="137244"/>
+                </a:cubicBezTo>
+                <a:cubicBezTo>
+                  <a:pt x="-111" y="130385"/>
+                  <a:pt x="49" y="129211"/>
+                  <a:pt x="0" y="121263"/>
+                </a:cubicBezTo>
+                <a:close/>
+              </a:path>
+              <a:path w="884048" h="258507" stroke="0" extrusionOk="0">
+                <a:moveTo>
+                  <a:pt x="0" y="121263"/>
+                </a:moveTo>
+                <a:cubicBezTo>
+                  <a:pt x="-1314" y="49340"/>
+                  <a:pt x="64367" y="-8872"/>
+                  <a:pt x="121263" y="0"/>
+                </a:cubicBezTo>
+                <a:cubicBezTo>
+                  <a:pt x="277590" y="-14100"/>
+                  <a:pt x="332679" y="26216"/>
+                  <a:pt x="448439" y="0"/>
+                </a:cubicBezTo>
+                <a:cubicBezTo>
+                  <a:pt x="564199" y="-26216"/>
+                  <a:pt x="620604" y="28094"/>
+                  <a:pt x="762785" y="0"/>
+                </a:cubicBezTo>
+                <a:cubicBezTo>
+                  <a:pt x="831179" y="-7985"/>
+                  <a:pt x="883214" y="71211"/>
+                  <a:pt x="884048" y="121263"/>
+                </a:cubicBezTo>
+                <a:cubicBezTo>
+                  <a:pt x="884734" y="127693"/>
+                  <a:pt x="883478" y="132171"/>
+                  <a:pt x="884048" y="137244"/>
+                </a:cubicBezTo>
+                <a:cubicBezTo>
+                  <a:pt x="877993" y="196069"/>
+                  <a:pt x="822385" y="254150"/>
+                  <a:pt x="762785" y="258507"/>
+                </a:cubicBezTo>
+                <a:cubicBezTo>
+                  <a:pt x="686558" y="296319"/>
+                  <a:pt x="567711" y="247927"/>
+                  <a:pt x="442024" y="258507"/>
+                </a:cubicBezTo>
+                <a:cubicBezTo>
+                  <a:pt x="316337" y="269087"/>
+                  <a:pt x="187395" y="246773"/>
+                  <a:pt x="121263" y="258507"/>
+                </a:cubicBezTo>
+                <a:cubicBezTo>
+                  <a:pt x="66747" y="268219"/>
+                  <a:pt x="6352" y="188294"/>
+                  <a:pt x="0" y="137244"/>
+                </a:cubicBezTo>
+                <a:cubicBezTo>
+                  <a:pt x="-982" y="132004"/>
+                  <a:pt x="972" y="125604"/>
+                  <a:pt x="0" y="121263"/>
+                </a:cubicBezTo>
+                <a:close/>
+              </a:path>
+            </a:pathLst>
+          </a:custGeom>
+          <a:solidFill>
+            <a:schemeClr val="bg2">
+              <a:lumMod val="10000"/>
+            </a:schemeClr>
+          </a:solidFill>
+          <a:ln w="28575">
+            <a:solidFill>
+              <a:schemeClr val="tx1"/>
+            </a:solidFill>
+            <a:extLst>
+              <a:ext uri="{C807C97D-BFC1-408E-A445-0C87EB9F89A2}">
+                <ask:lineSketchStyleProps xmlns:ask="http://schemas.microsoft.com/office/drawing/2018/sketchyshapes" sd="2586623134">
+                  <a:prstGeom prst="roundRect">
+                    <a:avLst>
+                      <a:gd name="adj" fmla="val 46909"/>
+                    </a:avLst>
+                  </a:prstGeom>
+                  <ask:type>
+                    <ask:lineSketchScribble/>
+                  </ask:type>
+                </ask:lineSketchStyleProps>
+              </a:ext>
+            </a:extLst>
+          </a:ln>
+        </p:spPr>
+        <p:style>
+          <a:lnRef idx="2">
+            <a:schemeClr val="accent1">
+              <a:shade val="50000"/>
+            </a:schemeClr>
+          </a:lnRef>
+          <a:fillRef idx="1">
+            <a:schemeClr val="accent1"/>
+          </a:fillRef>
+          <a:effectRef idx="0">
+            <a:schemeClr val="accent1"/>
+          </a:effectRef>
+          <a:fontRef idx="minor">
+            <a:schemeClr val="lt1"/>
+          </a:fontRef>
+        </p:style>
+        <p:txBody>
+          <a:bodyPr rtlCol="0" anchor="ctr"/>
+          <a:lstStyle/>
+          <a:p>
+            <a:pPr algn="ctr"/>
+            <a:endParaRPr lang="en-US"/>
+          </a:p>
+        </p:txBody>
+      </p:sp>
     </p:spTree>
     <p:extLst>
       <p:ext uri="{BB962C8B-B14F-4D97-AF65-F5344CB8AC3E}">

</xml_diff>